<commit_message>
file seperate settings 1.1
8/4
player 클래스 문제점 발견으로 구조 분리
</commit_message>
<xml_diff>
--- a/애니팡 모작 (1).pptx
+++ b/애니팡 모작 (1).pptx
@@ -269,7 +269,7 @@
           <a:p>
             <a:fld id="{12D0C193-C4F3-44D6-9BD6-544A6F836D68}" type="datetimeFigureOut">
               <a:rPr lang="ko-KR" altLang="en-US" smtClean="0"/>
-              <a:t>2025-07-28</a:t>
+              <a:t>2025-08-04</a:t>
             </a:fld>
             <a:endParaRPr lang="ko-KR" altLang="en-US"/>
           </a:p>
@@ -467,7 +467,7 @@
           <a:p>
             <a:fld id="{12D0C193-C4F3-44D6-9BD6-544A6F836D68}" type="datetimeFigureOut">
               <a:rPr lang="ko-KR" altLang="en-US" smtClean="0"/>
-              <a:t>2025-07-28</a:t>
+              <a:t>2025-08-04</a:t>
             </a:fld>
             <a:endParaRPr lang="ko-KR" altLang="en-US"/>
           </a:p>
@@ -675,7 +675,7 @@
           <a:p>
             <a:fld id="{12D0C193-C4F3-44D6-9BD6-544A6F836D68}" type="datetimeFigureOut">
               <a:rPr lang="ko-KR" altLang="en-US" smtClean="0"/>
-              <a:t>2025-07-28</a:t>
+              <a:t>2025-08-04</a:t>
             </a:fld>
             <a:endParaRPr lang="ko-KR" altLang="en-US"/>
           </a:p>
@@ -873,7 +873,7 @@
           <a:p>
             <a:fld id="{12D0C193-C4F3-44D6-9BD6-544A6F836D68}" type="datetimeFigureOut">
               <a:rPr lang="ko-KR" altLang="en-US" smtClean="0"/>
-              <a:t>2025-07-28</a:t>
+              <a:t>2025-08-04</a:t>
             </a:fld>
             <a:endParaRPr lang="ko-KR" altLang="en-US"/>
           </a:p>
@@ -1148,7 +1148,7 @@
           <a:p>
             <a:fld id="{12D0C193-C4F3-44D6-9BD6-544A6F836D68}" type="datetimeFigureOut">
               <a:rPr lang="ko-KR" altLang="en-US" smtClean="0"/>
-              <a:t>2025-07-28</a:t>
+              <a:t>2025-08-04</a:t>
             </a:fld>
             <a:endParaRPr lang="ko-KR" altLang="en-US"/>
           </a:p>
@@ -1413,7 +1413,7 @@
           <a:p>
             <a:fld id="{12D0C193-C4F3-44D6-9BD6-544A6F836D68}" type="datetimeFigureOut">
               <a:rPr lang="ko-KR" altLang="en-US" smtClean="0"/>
-              <a:t>2025-07-28</a:t>
+              <a:t>2025-08-04</a:t>
             </a:fld>
             <a:endParaRPr lang="ko-KR" altLang="en-US"/>
           </a:p>
@@ -1825,7 +1825,7 @@
           <a:p>
             <a:fld id="{12D0C193-C4F3-44D6-9BD6-544A6F836D68}" type="datetimeFigureOut">
               <a:rPr lang="ko-KR" altLang="en-US" smtClean="0"/>
-              <a:t>2025-07-28</a:t>
+              <a:t>2025-08-04</a:t>
             </a:fld>
             <a:endParaRPr lang="ko-KR" altLang="en-US"/>
           </a:p>
@@ -1966,7 +1966,7 @@
           <a:p>
             <a:fld id="{12D0C193-C4F3-44D6-9BD6-544A6F836D68}" type="datetimeFigureOut">
               <a:rPr lang="ko-KR" altLang="en-US" smtClean="0"/>
-              <a:t>2025-07-28</a:t>
+              <a:t>2025-08-04</a:t>
             </a:fld>
             <a:endParaRPr lang="ko-KR" altLang="en-US"/>
           </a:p>
@@ -2079,7 +2079,7 @@
           <a:p>
             <a:fld id="{12D0C193-C4F3-44D6-9BD6-544A6F836D68}" type="datetimeFigureOut">
               <a:rPr lang="ko-KR" altLang="en-US" smtClean="0"/>
-              <a:t>2025-07-28</a:t>
+              <a:t>2025-08-04</a:t>
             </a:fld>
             <a:endParaRPr lang="ko-KR" altLang="en-US"/>
           </a:p>
@@ -2390,7 +2390,7 @@
           <a:p>
             <a:fld id="{12D0C193-C4F3-44D6-9BD6-544A6F836D68}" type="datetimeFigureOut">
               <a:rPr lang="ko-KR" altLang="en-US" smtClean="0"/>
-              <a:t>2025-07-28</a:t>
+              <a:t>2025-08-04</a:t>
             </a:fld>
             <a:endParaRPr lang="ko-KR" altLang="en-US"/>
           </a:p>
@@ -2678,7 +2678,7 @@
           <a:p>
             <a:fld id="{12D0C193-C4F3-44D6-9BD6-544A6F836D68}" type="datetimeFigureOut">
               <a:rPr lang="ko-KR" altLang="en-US" smtClean="0"/>
-              <a:t>2025-07-28</a:t>
+              <a:t>2025-08-04</a:t>
             </a:fld>
             <a:endParaRPr lang="ko-KR" altLang="en-US"/>
           </a:p>
@@ -2919,7 +2919,7 @@
           <a:p>
             <a:fld id="{12D0C193-C4F3-44D6-9BD6-544A6F836D68}" type="datetimeFigureOut">
               <a:rPr lang="ko-KR" altLang="en-US" smtClean="0"/>
-              <a:t>2025-07-28</a:t>
+              <a:t>2025-08-04</a:t>
             </a:fld>
             <a:endParaRPr lang="ko-KR" altLang="en-US"/>
           </a:p>
@@ -3786,6 +3786,22 @@
             </a:r>
             <a:r>
               <a:rPr lang="ko-KR" altLang="en-US" dirty="0"/>
+              <a:t>산하</a:t>
+            </a:r>
+            <a:r>
+              <a:rPr lang="en-US" altLang="ko-KR" dirty="0"/>
+              <a:t> / </a:t>
+            </a:r>
+            <a:r>
+              <a:rPr lang="ko-KR" altLang="en-US" dirty="0"/>
+              <a:t>준영 </a:t>
+            </a:r>
+            <a:r>
+              <a:rPr lang="en-US" altLang="ko-KR" dirty="0"/>
+              <a:t>/ </a:t>
+            </a:r>
+            <a:r>
+              <a:rPr lang="ko-KR" altLang="en-US" dirty="0"/>
               <a:t>모였을 때</a:t>
             </a:r>
             <a:r>
@@ -3795,8 +3811,8 @@
           </a:p>
           <a:p>
             <a:r>
-              <a:rPr lang="ko-KR" altLang="en-US" dirty="0"/>
-              <a:t>순위확인</a:t>
+              <a:rPr lang="en-US" altLang="ko-KR" dirty="0" err="1"/>
+              <a:t>RankingScene</a:t>
             </a:r>
             <a:r>
               <a:rPr lang="en-US" altLang="ko-KR" dirty="0"/>
@@ -3808,11 +3824,77 @@
             </a:r>
             <a:r>
               <a:rPr lang="en-US" altLang="ko-KR" dirty="0"/>
+              <a:t>)</a:t>
+            </a:r>
+          </a:p>
+          <a:p>
+            <a:r>
+              <a:rPr lang="en-US" altLang="ko-KR" dirty="0" err="1"/>
+              <a:t>GameManager&amp;Scene&amp;Player</a:t>
+            </a:r>
+            <a:r>
+              <a:rPr lang="ko-KR" altLang="en-US" dirty="0"/>
+              <a:t> 클래스</a:t>
+            </a:r>
+            <a:r>
+              <a:rPr lang="en-US" altLang="ko-KR" dirty="0"/>
+              <a:t>(</a:t>
+            </a:r>
+            <a:r>
+              <a:rPr lang="ko-KR" altLang="en-US" dirty="0"/>
+              <a:t>준영</a:t>
+            </a:r>
+            <a:r>
+              <a:rPr lang="en-US" altLang="ko-KR" dirty="0"/>
+              <a:t>)</a:t>
+            </a:r>
+          </a:p>
+          <a:p>
+            <a:r>
+              <a:rPr lang="en-US" altLang="ko-KR" dirty="0" err="1"/>
+              <a:t>GameScene</a:t>
+            </a:r>
+            <a:r>
+              <a:rPr lang="en-US" altLang="ko-KR" dirty="0"/>
+              <a:t>(</a:t>
+            </a:r>
+            <a:r>
+              <a:rPr lang="ko-KR" altLang="en-US" dirty="0"/>
+              <a:t>준영 </a:t>
+            </a:r>
+            <a:r>
+              <a:rPr lang="en-US" altLang="ko-KR" dirty="0"/>
+              <a:t>&amp; </a:t>
+            </a:r>
+            <a:r>
+              <a:rPr lang="ko-KR" altLang="en-US" dirty="0"/>
+              <a:t>산하</a:t>
+            </a:r>
+            <a:r>
+              <a:rPr lang="en-US" altLang="ko-KR" dirty="0"/>
+              <a:t>)</a:t>
+            </a:r>
+          </a:p>
+          <a:p>
+            <a:r>
+              <a:rPr lang="ko-KR" altLang="en-US" dirty="0"/>
+              <a:t>점검 및 리뷰</a:t>
+            </a:r>
+            <a:r>
+              <a:rPr lang="en-US" altLang="ko-KR" dirty="0"/>
               <a:t>, </a:t>
             </a:r>
             <a:r>
               <a:rPr lang="ko-KR" altLang="en-US" dirty="0"/>
-              <a:t>선우  보조</a:t>
+              <a:t>수정</a:t>
+            </a:r>
+            <a:r>
+              <a:rPr lang="en-US" altLang="ko-KR" dirty="0"/>
+              <a:t>(</a:t>
+            </a:r>
+            <a:r>
+              <a:rPr lang="ko-KR" altLang="en-US" dirty="0"/>
+              <a:t>모였을 때</a:t>
             </a:r>
             <a:r>
               <a:rPr lang="en-US" altLang="ko-KR" dirty="0"/>
@@ -3820,25 +3902,20 @@
             </a:r>
           </a:p>
           <a:p>
-            <a:r>
-              <a:rPr lang="ko-KR" altLang="en-US" dirty="0"/>
-              <a:t>게임매니저</a:t>
-            </a:r>
-            <a:r>
-              <a:rPr lang="en-US" altLang="ko-KR" dirty="0"/>
-              <a:t>&amp;</a:t>
-            </a:r>
-            <a:r>
-              <a:rPr lang="ko-KR" altLang="en-US"/>
-              <a:t>플레이어 클래스</a:t>
-            </a:r>
-            <a:r>
-              <a:rPr lang="en-US" altLang="ko-KR" dirty="0"/>
-              <a:t>(</a:t>
-            </a:r>
-            <a:r>
-              <a:rPr lang="ko-KR" altLang="en-US" dirty="0"/>
-              <a:t>준영</a:t>
+            <a:endParaRPr lang="en-US" altLang="ko-KR" dirty="0"/>
+          </a:p>
+          <a:p>
+            <a:r>
+              <a:rPr lang="ko-KR" altLang="en-US" dirty="0"/>
+              <a:t>각자 개발은 주 </a:t>
+            </a:r>
+            <a:r>
+              <a:rPr lang="en-US" altLang="ko-KR" dirty="0"/>
+              <a:t>2</a:t>
+            </a:r>
+            <a:r>
+              <a:rPr lang="ko-KR" altLang="en-US" dirty="0"/>
+              <a:t>회 이상</a:t>
             </a:r>
             <a:r>
               <a:rPr lang="en-US" altLang="ko-KR" dirty="0"/>
@@ -3846,154 +3923,35 @@
             </a:r>
             <a:r>
               <a:rPr lang="ko-KR" altLang="en-US" dirty="0"/>
-              <a:t>모였을 때</a:t>
-            </a:r>
-            <a:r>
-              <a:rPr lang="en-US" altLang="ko-KR" dirty="0"/>
-              <a:t>)</a:t>
-            </a:r>
-          </a:p>
-          <a:p>
-            <a:r>
-              <a:rPr lang="ko-KR" altLang="en-US" dirty="0"/>
-              <a:t>게임 플레이</a:t>
-            </a:r>
-            <a:r>
-              <a:rPr lang="en-US" altLang="ko-KR" dirty="0"/>
-              <a:t>(</a:t>
-            </a:r>
-            <a:r>
-              <a:rPr lang="ko-KR" altLang="en-US" dirty="0"/>
-              <a:t>산하</a:t>
-            </a:r>
-            <a:r>
-              <a:rPr lang="en-US" altLang="ko-KR" dirty="0"/>
-              <a:t>, </a:t>
-            </a:r>
-            <a:r>
-              <a:rPr lang="ko-KR" altLang="en-US" dirty="0"/>
-              <a:t>준영</a:t>
-            </a:r>
-            <a:r>
-              <a:rPr lang="en-US" altLang="ko-KR" dirty="0"/>
-              <a:t>)</a:t>
-            </a:r>
-          </a:p>
-          <a:p>
-            <a:pPr lvl="1"/>
-            <a:r>
-              <a:rPr lang="ko-KR" altLang="en-US" dirty="0"/>
-              <a:t>전체 로직 짜기</a:t>
-            </a:r>
-            <a:r>
-              <a:rPr lang="en-US" altLang="ko-KR" dirty="0"/>
-              <a:t>(</a:t>
-            </a:r>
-            <a:r>
-              <a:rPr lang="ko-KR" altLang="en-US" dirty="0"/>
-              <a:t>모였을 때</a:t>
-            </a:r>
-            <a:r>
-              <a:rPr lang="en-US" altLang="ko-KR" dirty="0"/>
-              <a:t>)</a:t>
-            </a:r>
-          </a:p>
-          <a:p>
-            <a:pPr lvl="1"/>
-            <a:r>
-              <a:rPr lang="ko-KR" altLang="en-US" dirty="0"/>
-              <a:t>기본 시스템 </a:t>
+              <a:t>그때 정하기</a:t>
+            </a:r>
+            <a:endParaRPr lang="en-US" altLang="ko-KR" dirty="0"/>
+          </a:p>
+          <a:p>
+            <a:r>
+              <a:rPr lang="ko-KR" altLang="en-US" dirty="0"/>
+              <a:t>주별 회의 </a:t>
             </a:r>
             <a:r>
               <a:rPr lang="en-US" altLang="ko-KR" dirty="0"/>
               <a:t>– </a:t>
             </a:r>
             <a:r>
-              <a:rPr lang="ko-KR" altLang="en-US" dirty="0"/>
-              <a:t>동물이동</a:t>
-            </a:r>
-            <a:r>
-              <a:rPr lang="en-US" altLang="ko-KR" dirty="0"/>
-              <a:t>&amp;</a:t>
-            </a:r>
-            <a:r>
-              <a:rPr lang="ko-KR" altLang="en-US" dirty="0"/>
-              <a:t>검사</a:t>
-            </a:r>
-            <a:r>
-              <a:rPr lang="en-US" altLang="ko-KR" dirty="0"/>
-              <a:t>&amp;</a:t>
-            </a:r>
-            <a:r>
-              <a:rPr lang="ko-KR" altLang="en-US" dirty="0"/>
-              <a:t>아이템</a:t>
-            </a:r>
-            <a:r>
-              <a:rPr lang="en-US" altLang="ko-KR" dirty="0"/>
-              <a:t>(</a:t>
-            </a:r>
-            <a:r>
-              <a:rPr lang="ko-KR" altLang="en-US" dirty="0"/>
-              <a:t>산하</a:t>
-            </a:r>
-            <a:r>
-              <a:rPr lang="en-US" altLang="ko-KR" dirty="0"/>
-              <a:t>)</a:t>
-            </a:r>
-          </a:p>
-          <a:p>
-            <a:pPr lvl="1"/>
-            <a:r>
-              <a:rPr lang="ko-KR" altLang="en-US" dirty="0"/>
-              <a:t>기본 시스템 </a:t>
-            </a:r>
-            <a:r>
-              <a:rPr lang="en-US" altLang="ko-KR" dirty="0"/>
-              <a:t>– </a:t>
-            </a:r>
-            <a:r>
-              <a:rPr lang="ko-KR" altLang="en-US" dirty="0"/>
-              <a:t>득점</a:t>
-            </a:r>
-            <a:r>
-              <a:rPr lang="en-US" altLang="ko-KR" dirty="0"/>
-              <a:t>&amp;</a:t>
-            </a:r>
-            <a:r>
-              <a:rPr lang="ko-KR" altLang="en-US" dirty="0"/>
-              <a:t>콤보</a:t>
-            </a:r>
-            <a:r>
-              <a:rPr lang="en-US" altLang="ko-KR" dirty="0"/>
-              <a:t>&amp;</a:t>
-            </a:r>
-            <a:r>
-              <a:rPr lang="ko-KR" altLang="en-US" dirty="0"/>
-              <a:t>동물 내려오기</a:t>
-            </a:r>
-            <a:r>
-              <a:rPr lang="en-US" altLang="ko-KR" dirty="0"/>
-              <a:t>&amp;</a:t>
-            </a:r>
-            <a:r>
-              <a:rPr lang="ko-KR" altLang="en-US" dirty="0"/>
-              <a:t>종료</a:t>
-            </a:r>
-            <a:r>
-              <a:rPr lang="en-US" altLang="ko-KR" dirty="0"/>
-              <a:t>(</a:t>
-            </a:r>
-            <a:r>
-              <a:rPr lang="ko-KR" altLang="en-US" dirty="0"/>
-              <a:t>준영</a:t>
-            </a:r>
-            <a:r>
-              <a:rPr lang="en-US" altLang="ko-KR" dirty="0"/>
-              <a:t>)</a:t>
-            </a:r>
-          </a:p>
-          <a:p>
-            <a:pPr lvl="1"/>
+              <a:rPr lang="ko-KR" altLang="en-US" dirty="0" err="1"/>
+              <a:t>월금</a:t>
+            </a:r>
+            <a:r>
+              <a:rPr lang="ko-KR" altLang="en-US" dirty="0"/>
+              <a:t> </a:t>
+            </a:r>
+            <a:r>
+              <a:rPr lang="en-US" altLang="ko-KR" dirty="0"/>
+              <a:t>20</a:t>
+            </a:r>
+            <a:r>
+              <a:rPr lang="ko-KR" altLang="en-US" dirty="0"/>
+              <a:t>시</a:t>
+            </a:r>
             <a:endParaRPr lang="en-US" altLang="ko-KR" dirty="0"/>
           </a:p>
         </p:txBody>

</xml_diff>